<commit_message>
Updated documentation for #5
</commit_message>
<xml_diff>
--- a/Documentation/Logo-creation.pptx
+++ b/Documentation/Logo-creation.pptx
@@ -4312,7 +4312,7 @@
                   <a:schemeClr val="tx1"/>
                 </a:solidFill>
               </a:rPr>
-              <a:t>Send:</a:t>
+              <a:t>Event alert:</a:t>
             </a:r>
           </a:p>
           <a:p>
@@ -4399,8 +4399,12 @@
           <a:p>
             <a:pPr algn="ctr"/>
             <a:r>
+              <a:rPr lang="en-US" sz="1100" b="1" dirty="0"/>
+              <a:t>WOOF!</a:t>
+            </a:r>
+            <a:r>
               <a:rPr lang="en-US" sz="1100" dirty="0"/>
-              <a:t>Event Notifier</a:t>
+              <a:t> Notifier</a:t>
             </a:r>
           </a:p>
         </p:txBody>
@@ -4924,7 +4928,7 @@
         </p:blipFill>
         <p:spPr>
           <a:xfrm>
-            <a:off x="8467779" y="4191662"/>
+            <a:off x="8456238" y="4247912"/>
             <a:ext cx="351238" cy="313605"/>
           </a:xfrm>
           <a:prstGeom prst="rect">
@@ -4946,7 +4950,7 @@
         </p:nvSpPr>
         <p:spPr>
           <a:xfrm>
-            <a:off x="8735735" y="4250095"/>
+            <a:off x="8724194" y="4306345"/>
             <a:ext cx="764280" cy="261610"/>
           </a:xfrm>
           <a:prstGeom prst="rect">

</xml_diff>

<commit_message>
Updated Phase-1 initial build for MVP
</commit_message>
<xml_diff>
--- a/Documentation/Logo-creation.pptx
+++ b/Documentation/Logo-creation.pptx
@@ -4399,8 +4399,12 @@
           <a:p>
             <a:pPr algn="ctr"/>
             <a:r>
+              <a:rPr lang="en-US" sz="1100" b="1"/>
+              <a:t>WUPHF</a:t>
+            </a:r>
+            <a:r>
               <a:rPr lang="en-US" sz="1100" b="1" dirty="0"/>
-              <a:t>WOOF!</a:t>
+              <a:t>!</a:t>
             </a:r>
             <a:r>
               <a:rPr lang="en-US" sz="1100" dirty="0"/>

</xml_diff>